<commit_message>
Change ppt: Add s in the title slide 1
</commit_message>
<xml_diff>
--- a/GamingWebsite.pptx
+++ b/GamingWebsite.pptx
@@ -227,7 +227,7 @@
           <a:p>
             <a:fld id="{EF1077DB-935E-4A0A-947A-D283B9F9F452}" type="datetimeFigureOut">
               <a:rPr lang="en-US" smtClean="0"/>
-              <a:t>8/24/2021</a:t>
+              <a:t>8/27/2021</a:t>
             </a:fld>
             <a:endParaRPr lang="en-US"/>
           </a:p>
@@ -404,7 +404,7 @@
           <a:p>
             <a:fld id="{19EDBDA2-4480-4D82-8886-1B64A7ECBBAC}" type="datetimeFigureOut">
               <a:rPr lang="en-US" noProof="0" smtClean="0"/>
-              <a:t>8/24/2021</a:t>
+              <a:t>8/27/2021</a:t>
             </a:fld>
             <a:endParaRPr lang="en-US" noProof="0" dirty="0"/>
           </a:p>
@@ -9934,7 +9934,7 @@
                 <a16:creationId xmlns:a16="http://schemas.microsoft.com/office/drawing/2014/main" id="{9CA47B37-80B0-5A4F-BDC3-DE42D5B2D34F}"/>
               </a:ext>
               <a:ext uri="{C183D7F6-B498-43B3-948B-1728B52AA6E4}">
-                <adec:decorative xmlns:adec="http://schemas.microsoft.com/office/drawing/2017/decorative" xmlns="" val="1"/>
+                <adec:decorative xmlns:adec="http://schemas.microsoft.com/office/drawing/2017/decorative" val="1"/>
               </a:ext>
             </a:extLst>
           </p:cNvPr>
@@ -10152,7 +10152,7 @@
                 <a16:creationId xmlns:a16="http://schemas.microsoft.com/office/drawing/2014/main" id="{1A6AC2DF-47CD-A743-A120-FBE75B801CF3}"/>
               </a:ext>
               <a:ext uri="{C183D7F6-B498-43B3-948B-1728B52AA6E4}">
-                <adec:decorative xmlns:adec="http://schemas.microsoft.com/office/drawing/2017/decorative" xmlns="" val="1"/>
+                <adec:decorative xmlns:adec="http://schemas.microsoft.com/office/drawing/2017/decorative" val="1"/>
               </a:ext>
             </a:extLst>
           </p:cNvPr>
@@ -10379,7 +10379,7 @@
                 <a16:creationId xmlns:a16="http://schemas.microsoft.com/office/drawing/2014/main" id="{17E0F6BC-FBF2-3048-B833-61609739028C}"/>
               </a:ext>
               <a:ext uri="{C183D7F6-B498-43B3-948B-1728B52AA6E4}">
-                <adec:decorative xmlns:adec="http://schemas.microsoft.com/office/drawing/2017/decorative" xmlns="" val="1"/>
+                <adec:decorative xmlns:adec="http://schemas.microsoft.com/office/drawing/2017/decorative" val="1"/>
               </a:ext>
             </a:extLst>
           </p:cNvPr>
@@ -10597,7 +10597,7 @@
                 <a16:creationId xmlns:a16="http://schemas.microsoft.com/office/drawing/2014/main" id="{D0B0310F-833E-864C-9FB7-B2B2A6714808}"/>
               </a:ext>
               <a:ext uri="{C183D7F6-B498-43B3-948B-1728B52AA6E4}">
-                <adec:decorative xmlns:adec="http://schemas.microsoft.com/office/drawing/2017/decorative" xmlns="" val="1"/>
+                <adec:decorative xmlns:adec="http://schemas.microsoft.com/office/drawing/2017/decorative" val="1"/>
               </a:ext>
             </a:extLst>
           </p:cNvPr>
@@ -10820,7 +10820,7 @@
                 <a16:creationId xmlns:a16="http://schemas.microsoft.com/office/drawing/2014/main" id="{F906D597-BA39-4C4D-833F-CC0EE989B51C}"/>
               </a:ext>
               <a:ext uri="{C183D7F6-B498-43B3-948B-1728B52AA6E4}">
-                <adec:decorative xmlns:adec="http://schemas.microsoft.com/office/drawing/2017/decorative" xmlns="" val="1"/>
+                <adec:decorative xmlns:adec="http://schemas.microsoft.com/office/drawing/2017/decorative" val="1"/>
               </a:ext>
             </a:extLst>
           </p:cNvPr>
@@ -11183,7 +11183,7 @@
                 <a16:creationId xmlns:a16="http://schemas.microsoft.com/office/drawing/2014/main" id="{7D27D67C-932D-4270-A0E5-6F1F9315A231}"/>
               </a:ext>
               <a:ext uri="{C183D7F6-B498-43B3-948B-1728B52AA6E4}">
-                <adec:decorative xmlns:adec="http://schemas.microsoft.com/office/drawing/2017/decorative" xmlns="" val="1"/>
+                <adec:decorative xmlns:adec="http://schemas.microsoft.com/office/drawing/2017/decorative" val="1"/>
               </a:ext>
             </a:extLst>
           </p:cNvPr>
@@ -11263,7 +11263,7 @@
                 <a16:creationId xmlns:a16="http://schemas.microsoft.com/office/drawing/2014/main" id="{C987A1EC-DB2A-4AA3-8590-C488A6082E11}"/>
               </a:ext>
               <a:ext uri="{C183D7F6-B498-43B3-948B-1728B52AA6E4}">
-                <adec:decorative xmlns:adec="http://schemas.microsoft.com/office/drawing/2017/decorative" xmlns="" val="1"/>
+                <adec:decorative xmlns:adec="http://schemas.microsoft.com/office/drawing/2017/decorative" val="1"/>
               </a:ext>
             </a:extLst>
           </p:cNvPr>
@@ -13024,7 +13024,7 @@
                 <a16:creationId xmlns:a16="http://schemas.microsoft.com/office/drawing/2014/main" id="{4790D010-2852-DE49-BD36-340D6725D1D5}"/>
               </a:ext>
               <a:ext uri="{C183D7F6-B498-43B3-948B-1728B52AA6E4}">
-                <adec:decorative xmlns:adec="http://schemas.microsoft.com/office/drawing/2017/decorative" xmlns="" val="1"/>
+                <adec:decorative xmlns:adec="http://schemas.microsoft.com/office/drawing/2017/decorative" val="1"/>
               </a:ext>
             </a:extLst>
           </p:cNvPr>
@@ -13251,7 +13251,7 @@
                 <a16:creationId xmlns:a16="http://schemas.microsoft.com/office/drawing/2014/main" id="{C5D02C68-EB7D-E044-99A9-658364A3B2F0}"/>
               </a:ext>
               <a:ext uri="{C183D7F6-B498-43B3-948B-1728B52AA6E4}">
-                <adec:decorative xmlns:adec="http://schemas.microsoft.com/office/drawing/2017/decorative" xmlns="" val="1"/>
+                <adec:decorative xmlns:adec="http://schemas.microsoft.com/office/drawing/2017/decorative" val="1"/>
               </a:ext>
             </a:extLst>
           </p:cNvPr>
@@ -13469,7 +13469,7 @@
                 <a16:creationId xmlns:a16="http://schemas.microsoft.com/office/drawing/2014/main" id="{45962E1D-1D13-2B48-9F3B-CE31039DD236}"/>
               </a:ext>
               <a:ext uri="{C183D7F6-B498-43B3-948B-1728B52AA6E4}">
-                <adec:decorative xmlns:adec="http://schemas.microsoft.com/office/drawing/2017/decorative" xmlns="" val="1"/>
+                <adec:decorative xmlns:adec="http://schemas.microsoft.com/office/drawing/2017/decorative" val="1"/>
               </a:ext>
             </a:extLst>
           </p:cNvPr>
@@ -13837,7 +13837,7 @@
                 <a16:creationId xmlns:a16="http://schemas.microsoft.com/office/drawing/2014/main" id="{B9777B06-12C0-49D3-A18F-49D1E0574CE3}"/>
               </a:ext>
               <a:ext uri="{C183D7F6-B498-43B3-948B-1728B52AA6E4}">
-                <adec:decorative xmlns:adec="http://schemas.microsoft.com/office/drawing/2017/decorative" xmlns="" val="1"/>
+                <adec:decorative xmlns:adec="http://schemas.microsoft.com/office/drawing/2017/decorative" val="1"/>
               </a:ext>
             </a:extLst>
           </p:cNvPr>
@@ -13955,7 +13955,7 @@
                 <a16:creationId xmlns:a16="http://schemas.microsoft.com/office/drawing/2014/main" id="{5E3B0AD5-3645-8443-891F-C0E1D9763D7A}"/>
               </a:ext>
               <a:ext uri="{C183D7F6-B498-43B3-948B-1728B52AA6E4}">
-                <adec:decorative xmlns:adec="http://schemas.microsoft.com/office/drawing/2017/decorative" xmlns="" val="1"/>
+                <adec:decorative xmlns:adec="http://schemas.microsoft.com/office/drawing/2017/decorative" val="1"/>
               </a:ext>
             </a:extLst>
           </p:cNvPr>
@@ -14182,7 +14182,7 @@
                 <a16:creationId xmlns:a16="http://schemas.microsoft.com/office/drawing/2014/main" id="{BE9B724A-B58C-CD4D-8980-C0DFE08B79B5}"/>
               </a:ext>
               <a:ext uri="{C183D7F6-B498-43B3-948B-1728B52AA6E4}">
-                <adec:decorative xmlns:adec="http://schemas.microsoft.com/office/drawing/2017/decorative" xmlns="" val="1"/>
+                <adec:decorative xmlns:adec="http://schemas.microsoft.com/office/drawing/2017/decorative" val="1"/>
               </a:ext>
             </a:extLst>
           </p:cNvPr>
@@ -14405,7 +14405,7 @@
                 <a16:creationId xmlns:a16="http://schemas.microsoft.com/office/drawing/2014/main" id="{28894D68-6E31-8646-BFD7-2C0D8C4CD961}"/>
               </a:ext>
               <a:ext uri="{C183D7F6-B498-43B3-948B-1728B52AA6E4}">
-                <adec:decorative xmlns:adec="http://schemas.microsoft.com/office/drawing/2017/decorative" xmlns="" val="1"/>
+                <adec:decorative xmlns:adec="http://schemas.microsoft.com/office/drawing/2017/decorative" val="1"/>
               </a:ext>
             </a:extLst>
           </p:cNvPr>
@@ -14879,7 +14879,7 @@
                 <a16:creationId xmlns:a16="http://schemas.microsoft.com/office/drawing/2014/main" id="{99D3E8CF-7C38-4321-A56A-49D7CA2A814B}"/>
               </a:ext>
               <a:ext uri="{C183D7F6-B498-43B3-948B-1728B52AA6E4}">
-                <adec:decorative xmlns:adec="http://schemas.microsoft.com/office/drawing/2017/decorative" xmlns="" val="1"/>
+                <adec:decorative xmlns:adec="http://schemas.microsoft.com/office/drawing/2017/decorative" val="1"/>
               </a:ext>
             </a:extLst>
           </p:cNvPr>
@@ -14959,7 +14959,7 @@
                 <a16:creationId xmlns:a16="http://schemas.microsoft.com/office/drawing/2014/main" id="{326A7FE8-1975-474D-B747-D7B028C10D81}"/>
               </a:ext>
               <a:ext uri="{C183D7F6-B498-43B3-948B-1728B52AA6E4}">
-                <adec:decorative xmlns:adec="http://schemas.microsoft.com/office/drawing/2017/decorative" xmlns="" val="1"/>
+                <adec:decorative xmlns:adec="http://schemas.microsoft.com/office/drawing/2017/decorative" val="1"/>
               </a:ext>
             </a:extLst>
           </p:cNvPr>
@@ -15113,7 +15113,7 @@
                 <a16:creationId xmlns:a16="http://schemas.microsoft.com/office/drawing/2014/main" id="{69D5DB0A-C96D-4B82-95B6-E7A7B8E6687B}"/>
               </a:ext>
               <a:ext uri="{C183D7F6-B498-43B3-948B-1728B52AA6E4}">
-                <adec:decorative xmlns:adec="http://schemas.microsoft.com/office/drawing/2017/decorative" xmlns="" val="1"/>
+                <adec:decorative xmlns:adec="http://schemas.microsoft.com/office/drawing/2017/decorative" val="1"/>
               </a:ext>
             </a:extLst>
           </p:cNvPr>
@@ -15485,7 +15485,7 @@
                 <a16:creationId xmlns:a16="http://schemas.microsoft.com/office/drawing/2014/main" id="{390CA185-E043-470F-95CF-875B2290368D}"/>
               </a:ext>
               <a:ext uri="{C183D7F6-B498-43B3-948B-1728B52AA6E4}">
-                <adec:decorative xmlns:adec="http://schemas.microsoft.com/office/drawing/2017/decorative" xmlns="" val="1"/>
+                <adec:decorative xmlns:adec="http://schemas.microsoft.com/office/drawing/2017/decorative" val="1"/>
               </a:ext>
             </a:extLst>
           </p:cNvPr>
@@ -15708,7 +15708,7 @@
                 <a16:creationId xmlns:a16="http://schemas.microsoft.com/office/drawing/2014/main" id="{F1A887C7-02BE-4F5E-8DCF-A46A0C58093F}"/>
               </a:ext>
               <a:ext uri="{C183D7F6-B498-43B3-948B-1728B52AA6E4}">
-                <adec:decorative xmlns:adec="http://schemas.microsoft.com/office/drawing/2017/decorative" xmlns="" val="1"/>
+                <adec:decorative xmlns:adec="http://schemas.microsoft.com/office/drawing/2017/decorative" val="1"/>
               </a:ext>
             </a:extLst>
           </p:cNvPr>
@@ -15926,7 +15926,7 @@
                 <a16:creationId xmlns:a16="http://schemas.microsoft.com/office/drawing/2014/main" id="{22D0F7D1-0D65-4376-B381-E7B5C5F9EA0E}"/>
               </a:ext>
               <a:ext uri="{C183D7F6-B498-43B3-948B-1728B52AA6E4}">
-                <adec:decorative xmlns:adec="http://schemas.microsoft.com/office/drawing/2017/decorative" xmlns="" val="1"/>
+                <adec:decorative xmlns:adec="http://schemas.microsoft.com/office/drawing/2017/decorative" val="1"/>
               </a:ext>
             </a:extLst>
           </p:cNvPr>
@@ -16153,7 +16153,7 @@
                 <a16:creationId xmlns:a16="http://schemas.microsoft.com/office/drawing/2014/main" id="{7402406B-416D-47F8-A75D-831B8879AA66}"/>
               </a:ext>
               <a:ext uri="{C183D7F6-B498-43B3-948B-1728B52AA6E4}">
-                <adec:decorative xmlns:adec="http://schemas.microsoft.com/office/drawing/2017/decorative" xmlns="" val="1"/>
+                <adec:decorative xmlns:adec="http://schemas.microsoft.com/office/drawing/2017/decorative" val="1"/>
               </a:ext>
             </a:extLst>
           </p:cNvPr>
@@ -16376,7 +16376,7 @@
                 <a16:creationId xmlns:a16="http://schemas.microsoft.com/office/drawing/2014/main" id="{8E1008A4-54EE-4B43-9BCF-279C5CEA2D52}"/>
               </a:ext>
               <a:ext uri="{C183D7F6-B498-43B3-948B-1728B52AA6E4}">
-                <adec:decorative xmlns:adec="http://schemas.microsoft.com/office/drawing/2017/decorative" xmlns="" val="1"/>
+                <adec:decorative xmlns:adec="http://schemas.microsoft.com/office/drawing/2017/decorative" val="1"/>
               </a:ext>
             </a:extLst>
           </p:cNvPr>
@@ -16456,7 +16456,7 @@
                 <a16:creationId xmlns:a16="http://schemas.microsoft.com/office/drawing/2014/main" id="{8BD3F08B-8063-4DB3-9FBB-D9B9215CBA7C}"/>
               </a:ext>
               <a:ext uri="{C183D7F6-B498-43B3-948B-1728B52AA6E4}">
-                <adec:decorative xmlns:adec="http://schemas.microsoft.com/office/drawing/2017/decorative" xmlns="" val="1"/>
+                <adec:decorative xmlns:adec="http://schemas.microsoft.com/office/drawing/2017/decorative" val="1"/>
               </a:ext>
             </a:extLst>
           </p:cNvPr>
@@ -19816,7 +19816,7 @@
               <a:rPr lang="en-US" sz="6000" b="0" dirty="0">
                 <a:latin typeface="Cooper Black" panose="0208090404030B020404" pitchFamily="18" charset="0"/>
               </a:rPr>
-              <a:t>Buddies Hub</a:t>
+              <a:t>Buddies Hubs</a:t>
             </a:r>
           </a:p>
         </p:txBody>
@@ -20017,16 +20017,6 @@
               </a:rPr>
               <a:t>32</a:t>
             </a:r>
-            <a:r>
-              <a:rPr lang="en-US" b="0" spc="0" noProof="1">
-                <a:solidFill>
-                  <a:schemeClr val="bg1"/>
-                </a:solidFill>
-                <a:latin typeface="Bodoni MT" panose="02070603080606020203" pitchFamily="18" charset="0"/>
-                <a:cs typeface="Times New Roman" panose="02020603050405020304" pitchFamily="18" charset="0"/>
-              </a:rPr>
-              <a:t/>
-            </a:r>
             <a:br>
               <a:rPr lang="en-US" b="0" spc="0" noProof="1">
                 <a:solidFill>
@@ -20065,16 +20055,6 @@
                 <a:cs typeface="Times New Roman" panose="02020603050405020304" pitchFamily="18" charset="0"/>
               </a:rPr>
               <a:t>57</a:t>
-            </a:r>
-            <a:r>
-              <a:rPr lang="en-US" b="0" spc="0" noProof="1">
-                <a:solidFill>
-                  <a:schemeClr val="bg1"/>
-                </a:solidFill>
-                <a:latin typeface="Bodoni MT" panose="02070603080606020203" pitchFamily="18" charset="0"/>
-                <a:cs typeface="Times New Roman" panose="02020603050405020304" pitchFamily="18" charset="0"/>
-              </a:rPr>
-              <a:t/>
             </a:r>
             <a:br>
               <a:rPr lang="en-US" b="0" spc="0" noProof="1">
@@ -20861,21 +20841,8 @@
                   <a:schemeClr val="bg1"/>
                 </a:solidFill>
               </a:rPr>
-              <a:t>So keeping this in mind we have chosen to make four games from different domains which will help the players in all round development </a:t>
-            </a:r>
-            <a:r>
-              <a:rPr lang="en-US" sz="2000" dirty="0" smtClean="0">
-                <a:solidFill>
-                  <a:schemeClr val="bg1"/>
-                </a:solidFill>
-              </a:rPr>
-              <a:t>.</a:t>
-            </a:r>
-            <a:endParaRPr lang="en-US" sz="2000" dirty="0">
-              <a:solidFill>
-                <a:schemeClr val="bg1"/>
-              </a:solidFill>
-            </a:endParaRPr>
+              <a:t>So keeping this in mind we have chosen to make four games from different domains which will help the players in all round development .</a:t>
+            </a:r>
           </a:p>
           <a:p>
             <a:pPr marL="285750" indent="-285750">
@@ -23509,15 +23476,7 @@
                   <a:schemeClr val="bg1"/>
                 </a:solidFill>
               </a:rPr>
-              <a:t>Thus we are aiming to create a professional gaming website where people can enjoy and also learn along with having </a:t>
-            </a:r>
-            <a:r>
-              <a:rPr lang="en-US" sz="2000" dirty="0" smtClean="0">
-                <a:solidFill>
-                  <a:schemeClr val="bg1"/>
-                </a:solidFill>
-              </a:rPr>
-              <a:t>fun</a:t>
+              <a:t>Thus we are aiming to create a professional gaming website where people can enjoy and also learn along with having fun</a:t>
             </a:r>
           </a:p>
           <a:p>
@@ -23526,18 +23485,13 @@
               <a:buChar char="•"/>
             </a:pPr>
             <a:r>
-              <a:rPr lang="en-US" sz="2000" dirty="0" smtClean="0">
+              <a:rPr lang="en-US" sz="2000" dirty="0">
                 <a:solidFill>
                   <a:schemeClr val="bg1"/>
                 </a:solidFill>
               </a:rPr>
               <a:t>Therefore, our project model is B2C business model.</a:t>
             </a:r>
-            <a:endParaRPr lang="en-US" sz="2000" dirty="0">
-              <a:solidFill>
-                <a:schemeClr val="bg1"/>
-              </a:solidFill>
-            </a:endParaRPr>
           </a:p>
         </p:txBody>
       </p:sp>
@@ -23839,7 +23793,7 @@
                 <a16:creationId xmlns:a16="http://schemas.microsoft.com/office/drawing/2014/main" id="{11CFB4EA-0D13-41CC-BEEF-FB2D78D40C03}"/>
               </a:ext>
               <a:ext uri="{C183D7F6-B498-43B3-948B-1728B52AA6E4}">
-                <adec:decorative xmlns:adec="http://schemas.microsoft.com/office/drawing/2017/decorative" xmlns="" val="1"/>
+                <adec:decorative xmlns:adec="http://schemas.microsoft.com/office/drawing/2017/decorative" val="1"/>
               </a:ext>
             </a:extLst>
           </p:cNvPr>
@@ -23896,7 +23850,7 @@
                 <a16:creationId xmlns:a16="http://schemas.microsoft.com/office/drawing/2014/main" id="{0EC2A13F-9304-4151-817C-31EA50C99BFC}"/>
               </a:ext>
               <a:ext uri="{C183D7F6-B498-43B3-948B-1728B52AA6E4}">
-                <adec:decorative xmlns:adec="http://schemas.microsoft.com/office/drawing/2017/decorative" xmlns="" val="1"/>
+                <adec:decorative xmlns:adec="http://schemas.microsoft.com/office/drawing/2017/decorative" val="1"/>
               </a:ext>
             </a:extLst>
           </p:cNvPr>
@@ -23953,7 +23907,7 @@
                 <a16:creationId xmlns:a16="http://schemas.microsoft.com/office/drawing/2014/main" id="{E954A52F-9EAF-4BB5-9660-CE49C49C87A0}"/>
               </a:ext>
               <a:ext uri="{C183D7F6-B498-43B3-948B-1728B52AA6E4}">
-                <adec:decorative xmlns:adec="http://schemas.microsoft.com/office/drawing/2017/decorative" xmlns="" val="1"/>
+                <adec:decorative xmlns:adec="http://schemas.microsoft.com/office/drawing/2017/decorative" val="1"/>
               </a:ext>
             </a:extLst>
           </p:cNvPr>
@@ -24010,7 +23964,7 @@
                 <a16:creationId xmlns:a16="http://schemas.microsoft.com/office/drawing/2014/main" id="{BF9FF6C7-2796-49A5-9C7D-C0E40CD6DC8E}"/>
               </a:ext>
               <a:ext uri="{C183D7F6-B498-43B3-948B-1728B52AA6E4}">
-                <adec:decorative xmlns:adec="http://schemas.microsoft.com/office/drawing/2017/decorative" xmlns="" val="1"/>
+                <adec:decorative xmlns:adec="http://schemas.microsoft.com/office/drawing/2017/decorative" val="1"/>
               </a:ext>
             </a:extLst>
           </p:cNvPr>
@@ -24067,7 +24021,7 @@
                 <a16:creationId xmlns:a16="http://schemas.microsoft.com/office/drawing/2014/main" id="{91F29178-D71F-4236-BF0B-468D6EA750F5}"/>
               </a:ext>
               <a:ext uri="{C183D7F6-B498-43B3-948B-1728B52AA6E4}">
-                <adec:decorative xmlns:adec="http://schemas.microsoft.com/office/drawing/2017/decorative" xmlns="" val="1"/>
+                <adec:decorative xmlns:adec="http://schemas.microsoft.com/office/drawing/2017/decorative" val="1"/>
               </a:ext>
             </a:extLst>
           </p:cNvPr>
@@ -24124,7 +24078,7 @@
                 <a16:creationId xmlns:a16="http://schemas.microsoft.com/office/drawing/2014/main" id="{4D254535-E302-41FC-A950-83B5D81A8C5D}"/>
               </a:ext>
               <a:ext uri="{C183D7F6-B498-43B3-948B-1728B52AA6E4}">
-                <adec:decorative xmlns:adec="http://schemas.microsoft.com/office/drawing/2017/decorative" xmlns="" val="1"/>
+                <adec:decorative xmlns:adec="http://schemas.microsoft.com/office/drawing/2017/decorative" val="1"/>
               </a:ext>
             </a:extLst>
           </p:cNvPr>
@@ -24181,7 +24135,7 @@
                 <a16:creationId xmlns:a16="http://schemas.microsoft.com/office/drawing/2014/main" id="{74E24123-09C3-412A-A0AC-01A531C3F2A2}"/>
               </a:ext>
               <a:ext uri="{C183D7F6-B498-43B3-948B-1728B52AA6E4}">
-                <adec:decorative xmlns:adec="http://schemas.microsoft.com/office/drawing/2017/decorative" xmlns="" val="1"/>
+                <adec:decorative xmlns:adec="http://schemas.microsoft.com/office/drawing/2017/decorative" val="1"/>
               </a:ext>
             </a:extLst>
           </p:cNvPr>
@@ -24238,7 +24192,7 @@
                 <a16:creationId xmlns:a16="http://schemas.microsoft.com/office/drawing/2014/main" id="{A71C35B5-EF1E-4466-8CBA-09E9BD28EBFC}"/>
               </a:ext>
               <a:ext uri="{C183D7F6-B498-43B3-948B-1728B52AA6E4}">
-                <adec:decorative xmlns:adec="http://schemas.microsoft.com/office/drawing/2017/decorative" xmlns="" val="1"/>
+                <adec:decorative xmlns:adec="http://schemas.microsoft.com/office/drawing/2017/decorative" val="1"/>
               </a:ext>
             </a:extLst>
           </p:cNvPr>
@@ -24295,7 +24249,7 @@
                 <a16:creationId xmlns:a16="http://schemas.microsoft.com/office/drawing/2014/main" id="{83330E7D-EB08-4DC0-824C-D6F4F1E6F2E2}"/>
               </a:ext>
               <a:ext uri="{C183D7F6-B498-43B3-948B-1728B52AA6E4}">
-                <adec:decorative xmlns:adec="http://schemas.microsoft.com/office/drawing/2017/decorative" xmlns="" val="1"/>
+                <adec:decorative xmlns:adec="http://schemas.microsoft.com/office/drawing/2017/decorative" val="1"/>
               </a:ext>
             </a:extLst>
           </p:cNvPr>
@@ -24352,7 +24306,7 @@
                 <a16:creationId xmlns:a16="http://schemas.microsoft.com/office/drawing/2014/main" id="{011343D9-727E-4934-9414-F39753562EC5}"/>
               </a:ext>
               <a:ext uri="{C183D7F6-B498-43B3-948B-1728B52AA6E4}">
-                <adec:decorative xmlns:adec="http://schemas.microsoft.com/office/drawing/2017/decorative" xmlns="" val="1"/>
+                <adec:decorative xmlns:adec="http://schemas.microsoft.com/office/drawing/2017/decorative" val="1"/>
               </a:ext>
             </a:extLst>
           </p:cNvPr>
@@ -24409,7 +24363,7 @@
                 <a16:creationId xmlns:a16="http://schemas.microsoft.com/office/drawing/2014/main" id="{C3F4994E-3A7C-403A-AE6C-FB7AA35A2F18}"/>
               </a:ext>
               <a:ext uri="{C183D7F6-B498-43B3-948B-1728B52AA6E4}">
-                <adec:decorative xmlns:adec="http://schemas.microsoft.com/office/drawing/2017/decorative" xmlns="" val="1"/>
+                <adec:decorative xmlns:adec="http://schemas.microsoft.com/office/drawing/2017/decorative" val="1"/>
               </a:ext>
             </a:extLst>
           </p:cNvPr>
@@ -24466,7 +24420,7 @@
                 <a16:creationId xmlns:a16="http://schemas.microsoft.com/office/drawing/2014/main" id="{417F4243-6058-4AE8-AF61-8FD432B90713}"/>
               </a:ext>
               <a:ext uri="{C183D7F6-B498-43B3-948B-1728B52AA6E4}">
-                <adec:decorative xmlns:adec="http://schemas.microsoft.com/office/drawing/2017/decorative" xmlns="" val="1"/>
+                <adec:decorative xmlns:adec="http://schemas.microsoft.com/office/drawing/2017/decorative" val="1"/>
               </a:ext>
             </a:extLst>
           </p:cNvPr>

</xml_diff>

<commit_message>
ppt content s removed
</commit_message>
<xml_diff>
--- a/GamingWebsite.pptx
+++ b/GamingWebsite.pptx
@@ -227,7 +227,7 @@
           <a:p>
             <a:fld id="{EF1077DB-935E-4A0A-947A-D283B9F9F452}" type="datetimeFigureOut">
               <a:rPr lang="en-US" smtClean="0"/>
-              <a:t>8/27/2021</a:t>
+              <a:t>10/1/2021</a:t>
             </a:fld>
             <a:endParaRPr lang="en-US"/>
           </a:p>
@@ -404,7 +404,7 @@
           <a:p>
             <a:fld id="{19EDBDA2-4480-4D82-8886-1B64A7ECBBAC}" type="datetimeFigureOut">
               <a:rPr lang="en-US" noProof="0" smtClean="0"/>
-              <a:t>8/27/2021</a:t>
+              <a:t>10/1/2021</a:t>
             </a:fld>
             <a:endParaRPr lang="en-US" noProof="0" dirty="0"/>
           </a:p>
@@ -19813,11 +19813,14 @@
           <a:p>
             <a:pPr algn="ctr"/>
             <a:r>
-              <a:rPr lang="en-US" sz="6000" b="0" dirty="0">
+              <a:rPr lang="en-US" sz="6000" b="0">
                 <a:latin typeface="Cooper Black" panose="0208090404030B020404" pitchFamily="18" charset="0"/>
               </a:rPr>
-              <a:t>Buddies Hubs</a:t>
-            </a:r>
+              <a:t>Buddies Hub</a:t>
+            </a:r>
+            <a:endParaRPr lang="en-US" sz="6000" b="0" dirty="0">
+              <a:latin typeface="Cooper Black" panose="0208090404030B020404" pitchFamily="18" charset="0"/>
+            </a:endParaRPr>
           </a:p>
         </p:txBody>
       </p:sp>

</xml_diff>